<commit_message>
update estimation flow chart
</commit_message>
<xml_diff>
--- a/docs/images/estimation_example.pptx
+++ b/docs/images/estimation_example.pptx
@@ -3583,7 +3583,7 @@
         </p:nvSpPr>
         <p:spPr>
           <a:xfrm>
-            <a:off x="7574103" y="4408314"/>
+            <a:off x="7574103" y="4524426"/>
             <a:ext cx="2543455" cy="307548"/>
           </a:xfrm>
           <a:prstGeom prst="roundRect">
@@ -3641,7 +3641,7 @@
         </p:nvSpPr>
         <p:spPr>
           <a:xfrm>
-            <a:off x="-957801" y="5812759"/>
+            <a:off x="-957801" y="5928871"/>
             <a:ext cx="2543454" cy="307548"/>
           </a:xfrm>
           <a:prstGeom prst="roundRect">
@@ -3696,7 +3696,7 @@
         </p:nvSpPr>
         <p:spPr>
           <a:xfrm>
-            <a:off x="10676418" y="3531208"/>
+            <a:off x="10694925" y="3481596"/>
             <a:ext cx="2153223" cy="2700755"/>
           </a:xfrm>
           <a:prstGeom prst="roundRect">
@@ -3748,7 +3748,7 @@
         </p:nvSpPr>
         <p:spPr>
           <a:xfrm>
-            <a:off x="10887345" y="4107895"/>
+            <a:off x="10905852" y="4058283"/>
             <a:ext cx="1774343" cy="327183"/>
           </a:xfrm>
           <a:prstGeom prst="roundRect">
@@ -3806,7 +3806,7 @@
         </p:nvSpPr>
         <p:spPr>
           <a:xfrm>
-            <a:off x="10887345" y="4894478"/>
+            <a:off x="10905852" y="4844866"/>
             <a:ext cx="1760345" cy="328208"/>
           </a:xfrm>
           <a:prstGeom prst="roundRect">
@@ -3864,7 +3864,7 @@
         </p:nvSpPr>
         <p:spPr>
           <a:xfrm>
-            <a:off x="10887343" y="3721514"/>
+            <a:off x="10905850" y="3671902"/>
             <a:ext cx="1774345" cy="300909"/>
           </a:xfrm>
           <a:prstGeom prst="roundRect">
@@ -3922,7 +3922,7 @@
         </p:nvSpPr>
         <p:spPr>
           <a:xfrm>
-            <a:off x="10873347" y="4514323"/>
+            <a:off x="10891854" y="4464711"/>
             <a:ext cx="1774343" cy="300909"/>
           </a:xfrm>
           <a:prstGeom prst="roundRect">
@@ -3980,7 +3980,7 @@
         </p:nvSpPr>
         <p:spPr>
           <a:xfrm>
-            <a:off x="10887343" y="5321574"/>
+            <a:off x="10905850" y="5271962"/>
             <a:ext cx="1760345" cy="328208"/>
           </a:xfrm>
           <a:prstGeom prst="roundRect">
@@ -5205,7 +5205,7 @@
         <p:spPr>
           <a:xfrm>
             <a:off x="-1755054" y="2533110"/>
-            <a:ext cx="9715" cy="1853952"/>
+            <a:ext cx="0" cy="1970221"/>
           </a:xfrm>
           <a:prstGeom prst="straightConnector1">
             <a:avLst/>
@@ -5541,7 +5541,7 @@
         </p:nvSpPr>
         <p:spPr>
           <a:xfrm>
-            <a:off x="-3470067" y="4377422"/>
+            <a:off x="-3470067" y="4493534"/>
             <a:ext cx="2543456" cy="369332"/>
           </a:xfrm>
           <a:prstGeom prst="rect">
@@ -5576,7 +5576,7 @@
         </p:nvSpPr>
         <p:spPr>
           <a:xfrm>
-            <a:off x="-2995898" y="5781867"/>
+            <a:off x="-2995898" y="5897979"/>
             <a:ext cx="2083801" cy="369332"/>
           </a:xfrm>
           <a:prstGeom prst="rect">
@@ -5611,7 +5611,7 @@
         </p:nvSpPr>
         <p:spPr>
           <a:xfrm>
-            <a:off x="-957802" y="4408314"/>
+            <a:off x="-957802" y="4524426"/>
             <a:ext cx="2543455" cy="307548"/>
           </a:xfrm>
           <a:prstGeom prst="roundRect">
@@ -5669,7 +5669,7 @@
         </p:nvSpPr>
         <p:spPr>
           <a:xfrm>
-            <a:off x="1894463" y="4408314"/>
+            <a:off x="1894463" y="4524426"/>
             <a:ext cx="2543455" cy="307548"/>
           </a:xfrm>
           <a:prstGeom prst="roundRect">
@@ -5727,7 +5727,7 @@
         </p:nvSpPr>
         <p:spPr>
           <a:xfrm>
-            <a:off x="4746727" y="4408314"/>
+            <a:off x="4746727" y="4524426"/>
             <a:ext cx="2543455" cy="307548"/>
           </a:xfrm>
           <a:prstGeom prst="roundRect">
@@ -5785,7 +5785,7 @@
         </p:nvSpPr>
         <p:spPr>
           <a:xfrm>
-            <a:off x="7634684" y="4847494"/>
+            <a:off x="7634684" y="4963606"/>
             <a:ext cx="1795732" cy="276999"/>
           </a:xfrm>
           <a:prstGeom prst="rect">
@@ -5823,7 +5823,7 @@
         </p:nvSpPr>
         <p:spPr>
           <a:xfrm>
-            <a:off x="-800617" y="4882743"/>
+            <a:off x="-800617" y="4998855"/>
             <a:ext cx="1795732" cy="276999"/>
           </a:xfrm>
           <a:prstGeom prst="rect">
@@ -5861,7 +5861,7 @@
         </p:nvSpPr>
         <p:spPr>
           <a:xfrm>
-            <a:off x="2011150" y="4859095"/>
+            <a:off x="2011150" y="4975207"/>
             <a:ext cx="1795732" cy="276999"/>
           </a:xfrm>
           <a:prstGeom prst="rect">
@@ -5899,7 +5899,7 @@
         </p:nvSpPr>
         <p:spPr>
           <a:xfrm>
-            <a:off x="4822917" y="4881586"/>
+            <a:off x="4822917" y="4997698"/>
             <a:ext cx="1795732" cy="646331"/>
           </a:xfrm>
           <a:prstGeom prst="rect">
@@ -6077,7 +6077,7 @@
         </p:nvCxnSpPr>
         <p:spPr>
           <a:xfrm>
-            <a:off x="-1742704" y="4847494"/>
+            <a:off x="-1742704" y="4963606"/>
             <a:ext cx="0" cy="934373"/>
           </a:xfrm>
           <a:prstGeom prst="straightConnector1">
@@ -6119,7 +6119,7 @@
         </p:nvSpPr>
         <p:spPr>
           <a:xfrm>
-            <a:off x="-5570505" y="5077868"/>
+            <a:off x="-5570505" y="5193980"/>
             <a:ext cx="3767318" cy="369332"/>
           </a:xfrm>
           <a:prstGeom prst="rect">
@@ -6154,7 +6154,7 @@
         </p:nvSpPr>
         <p:spPr>
           <a:xfrm>
-            <a:off x="-800617" y="6244045"/>
+            <a:off x="-800617" y="6360157"/>
             <a:ext cx="2408524" cy="276999"/>
           </a:xfrm>
           <a:prstGeom prst="rect">
@@ -6192,7 +6192,7 @@
         </p:nvSpPr>
         <p:spPr>
           <a:xfrm>
-            <a:off x="-2836243" y="7130782"/>
+            <a:off x="-2836243" y="7246894"/>
             <a:ext cx="2083801" cy="369332"/>
           </a:xfrm>
           <a:prstGeom prst="rect">
@@ -6227,7 +6227,7 @@
         </p:nvSpPr>
         <p:spPr>
           <a:xfrm>
-            <a:off x="-3096475" y="6382544"/>
+            <a:off x="-3096475" y="6498656"/>
             <a:ext cx="1390189" cy="369332"/>
           </a:xfrm>
           <a:prstGeom prst="rect">
@@ -6262,7 +6262,7 @@
         </p:nvSpPr>
         <p:spPr>
           <a:xfrm>
-            <a:off x="-800617" y="7566332"/>
+            <a:off x="-800617" y="7682444"/>
             <a:ext cx="2408524" cy="461665"/>
           </a:xfrm>
           <a:prstGeom prst="rect">
@@ -6281,7 +6281,17 @@
             </a:pPr>
             <a:r>
               <a:rPr lang="en-US" sz="1200" dirty="0"/>
-              <a:t>Survey table + override model choices table</a:t>
+              <a:t>Override model choices fields</a:t>
+            </a:r>
+          </a:p>
+          <a:p>
+            <a:pPr marL="285750" indent="-285750">
+              <a:buFont typeface="Arial" panose="020B0604020202020204" pitchFamily="34" charset="0"/>
+              <a:buChar char="•"/>
+            </a:pPr>
+            <a:r>
+              <a:rPr lang="en-US" sz="1200" dirty="0"/>
+              <a:t>Additional calculated fields</a:t>
             </a:r>
           </a:p>
         </p:txBody>
@@ -6302,7 +6312,7 @@
         </p:nvCxnSpPr>
         <p:spPr>
           <a:xfrm>
-            <a:off x="2979184" y="7211360"/>
+            <a:off x="2979184" y="7327472"/>
             <a:ext cx="0" cy="208176"/>
           </a:xfrm>
           <a:prstGeom prst="straightConnector1">
@@ -6344,7 +6354,7 @@
         </p:nvSpPr>
         <p:spPr>
           <a:xfrm>
-            <a:off x="-957803" y="7160232"/>
+            <a:off x="-957803" y="7276344"/>
             <a:ext cx="2543456" cy="310432"/>
           </a:xfrm>
           <a:prstGeom prst="roundRect">
@@ -6399,7 +6409,7 @@
         </p:nvSpPr>
         <p:spPr>
           <a:xfrm>
-            <a:off x="1894462" y="7160232"/>
+            <a:off x="1894462" y="7276344"/>
             <a:ext cx="2543456" cy="310432"/>
           </a:xfrm>
           <a:prstGeom prst="roundRect">
@@ -6454,7 +6464,7 @@
         </p:nvSpPr>
         <p:spPr>
           <a:xfrm>
-            <a:off x="7574102" y="7160232"/>
+            <a:off x="7574102" y="7276344"/>
             <a:ext cx="2543456" cy="310432"/>
           </a:xfrm>
           <a:prstGeom prst="roundRect">
@@ -6509,7 +6519,7 @@
         </p:nvSpPr>
         <p:spPr>
           <a:xfrm>
-            <a:off x="4746726" y="7160232"/>
+            <a:off x="4746726" y="7276344"/>
             <a:ext cx="2543456" cy="310432"/>
           </a:xfrm>
           <a:prstGeom prst="roundRect">
@@ -6564,7 +6574,7 @@
         </p:nvSpPr>
         <p:spPr>
           <a:xfrm>
-            <a:off x="10472614" y="7160232"/>
+            <a:off x="10472614" y="7276344"/>
             <a:ext cx="2543456" cy="310432"/>
           </a:xfrm>
           <a:prstGeom prst="roundRect">
@@ -6619,7 +6629,7 @@
         </p:nvSpPr>
         <p:spPr>
           <a:xfrm>
-            <a:off x="10880345" y="5750015"/>
+            <a:off x="10898852" y="5700403"/>
             <a:ext cx="1760345" cy="328208"/>
           </a:xfrm>
           <a:prstGeom prst="roundRect">
@@ -6675,7 +6685,7 @@
         <p:spPr>
           <a:xfrm>
             <a:off x="-800617" y="2540343"/>
-            <a:ext cx="1969977" cy="461665"/>
+            <a:ext cx="1969977" cy="646331"/>
           </a:xfrm>
           <a:prstGeom prst="rect">
             <a:avLst/>
@@ -6686,6 +6696,16 @@
             <a:spAutoFit/>
           </a:bodyPr>
           <a:lstStyle/>
+          <a:p>
+            <a:pPr marL="285750" indent="-285750">
+              <a:buFont typeface="Arial" panose="020B0604020202020204" pitchFamily="34" charset="0"/>
+              <a:buChar char="•"/>
+            </a:pPr>
+            <a:r>
+              <a:rPr lang="en-US" sz="1200" dirty="0"/>
+              <a:t>Survey table +</a:t>
+            </a:r>
+          </a:p>
           <a:p>
             <a:pPr marL="285750" indent="-285750">
               <a:buFont typeface="Arial" panose="020B0604020202020204" pitchFamily="34" charset="0"/>
@@ -6720,7 +6740,7 @@
         <p:spPr>
           <a:xfrm>
             <a:off x="2011149" y="2540343"/>
-            <a:ext cx="3029169" cy="1754326"/>
+            <a:ext cx="3029169" cy="1938992"/>
           </a:xfrm>
           <a:prstGeom prst="rect">
             <a:avLst/>
@@ -6731,6 +6751,16 @@
             <a:spAutoFit/>
           </a:bodyPr>
           <a:lstStyle/>
+          <a:p>
+            <a:pPr marL="285750" indent="-285750">
+              <a:buFont typeface="Arial" panose="020B0604020202020204" pitchFamily="34" charset="0"/>
+              <a:buChar char="•"/>
+            </a:pPr>
+            <a:r>
+              <a:rPr lang="en-US" sz="1200" dirty="0"/>
+              <a:t>Survey table +</a:t>
+            </a:r>
+          </a:p>
           <a:p>
             <a:pPr marL="285750" indent="-285750">
               <a:buFont typeface="Arial" panose="020B0604020202020204" pitchFamily="34" charset="0"/>
@@ -6838,7 +6868,7 @@
         <p:spPr>
           <a:xfrm>
             <a:off x="4822917" y="2540343"/>
-            <a:ext cx="2325033" cy="1015663"/>
+            <a:ext cx="2325033" cy="1200329"/>
           </a:xfrm>
           <a:prstGeom prst="rect">
             <a:avLst/>
@@ -6849,6 +6879,16 @@
             <a:spAutoFit/>
           </a:bodyPr>
           <a:lstStyle/>
+          <a:p>
+            <a:pPr marL="285750" indent="-285750">
+              <a:buFont typeface="Arial" panose="020B0604020202020204" pitchFamily="34" charset="0"/>
+              <a:buChar char="•"/>
+            </a:pPr>
+            <a:r>
+              <a:rPr lang="en-US" sz="1200" dirty="0"/>
+              <a:t>Survey table +</a:t>
+            </a:r>
+          </a:p>
           <a:p>
             <a:pPr marL="285750" indent="-285750">
               <a:buFont typeface="Arial" panose="020B0604020202020204" pitchFamily="34" charset="0"/>
@@ -6916,7 +6956,7 @@
         <p:spPr>
           <a:xfrm>
             <a:off x="7634684" y="2540343"/>
-            <a:ext cx="1996140" cy="646331"/>
+            <a:ext cx="1996140" cy="830997"/>
           </a:xfrm>
           <a:prstGeom prst="rect">
             <a:avLst/>
@@ -6927,6 +6967,16 @@
             <a:spAutoFit/>
           </a:bodyPr>
           <a:lstStyle/>
+          <a:p>
+            <a:pPr marL="285750" indent="-285750">
+              <a:buFont typeface="Arial" panose="020B0604020202020204" pitchFamily="34" charset="0"/>
+              <a:buChar char="•"/>
+            </a:pPr>
+            <a:r>
+              <a:rPr lang="en-US" sz="1200" dirty="0"/>
+              <a:t>Survey table +</a:t>
+            </a:r>
+          </a:p>
           <a:p>
             <a:pPr marL="285750" indent="-285750">
               <a:buFont typeface="Arial" panose="020B0604020202020204" pitchFamily="34" charset="0"/>
@@ -6970,7 +7020,7 @@
         </p:nvSpPr>
         <p:spPr>
           <a:xfrm>
-            <a:off x="2011150" y="7566332"/>
+            <a:off x="2011150" y="7682444"/>
             <a:ext cx="2408524" cy="461665"/>
           </a:xfrm>
           <a:prstGeom prst="rect">
@@ -6989,7 +7039,17 @@
             </a:pPr>
             <a:r>
               <a:rPr lang="en-US" sz="1200" dirty="0"/>
-              <a:t>Survey table + override model choices table</a:t>
+              <a:t>Override model choices fields</a:t>
+            </a:r>
+          </a:p>
+          <a:p>
+            <a:pPr marL="285750" indent="-285750">
+              <a:buFont typeface="Arial" panose="020B0604020202020204" pitchFamily="34" charset="0"/>
+              <a:buChar char="•"/>
+            </a:pPr>
+            <a:r>
+              <a:rPr lang="en-US" sz="1200" dirty="0"/>
+              <a:t>Additional calculated fields</a:t>
             </a:r>
           </a:p>
         </p:txBody>
@@ -7008,7 +7068,7 @@
         </p:nvSpPr>
         <p:spPr>
           <a:xfrm>
-            <a:off x="4822917" y="7566332"/>
+            <a:off x="4822917" y="7682444"/>
             <a:ext cx="2408524" cy="461665"/>
           </a:xfrm>
           <a:prstGeom prst="rect">
@@ -7027,7 +7087,17 @@
             </a:pPr>
             <a:r>
               <a:rPr lang="en-US" sz="1200" dirty="0"/>
-              <a:t>Survey table + override model choices table</a:t>
+              <a:t>Override model choices fields</a:t>
+            </a:r>
+          </a:p>
+          <a:p>
+            <a:pPr marL="285750" indent="-285750">
+              <a:buFont typeface="Arial" panose="020B0604020202020204" pitchFamily="34" charset="0"/>
+              <a:buChar char="•"/>
+            </a:pPr>
+            <a:r>
+              <a:rPr lang="en-US" sz="1200" dirty="0"/>
+              <a:t>Additional calculated fields</a:t>
             </a:r>
           </a:p>
         </p:txBody>
@@ -7046,7 +7116,7 @@
         </p:nvSpPr>
         <p:spPr>
           <a:xfrm>
-            <a:off x="7634684" y="7566332"/>
+            <a:off x="7634684" y="7682444"/>
             <a:ext cx="2408524" cy="461665"/>
           </a:xfrm>
           <a:prstGeom prst="rect">
@@ -7065,7 +7135,17 @@
             </a:pPr>
             <a:r>
               <a:rPr lang="en-US" sz="1200" dirty="0"/>
-              <a:t>Survey table + override model choices table</a:t>
+              <a:t>Override model choices fields</a:t>
+            </a:r>
+          </a:p>
+          <a:p>
+            <a:pPr marL="285750" indent="-285750">
+              <a:buFont typeface="Arial" panose="020B0604020202020204" pitchFamily="34" charset="0"/>
+              <a:buChar char="•"/>
+            </a:pPr>
+            <a:r>
+              <a:rPr lang="en-US" sz="1200" dirty="0"/>
+              <a:t>Additional calculated fields</a:t>
             </a:r>
           </a:p>
         </p:txBody>
@@ -7084,7 +7164,7 @@
         </p:nvSpPr>
         <p:spPr>
           <a:xfrm>
-            <a:off x="10607546" y="7566332"/>
+            <a:off x="10607546" y="7682444"/>
             <a:ext cx="2408524" cy="461665"/>
           </a:xfrm>
           <a:prstGeom prst="rect">
@@ -7207,7 +7287,7 @@
         </p:nvCxnSpPr>
         <p:spPr>
           <a:xfrm>
-            <a:off x="-1739158" y="6160951"/>
+            <a:off x="-1739158" y="6277063"/>
             <a:ext cx="0" cy="934373"/>
           </a:xfrm>
           <a:prstGeom prst="straightConnector1">

</xml_diff>